<commit_message>
1.1 - PowerPoint Style
</commit_message>
<xml_diff>
--- a/movie_presentation.pptx
+++ b/movie_presentation.pptx
@@ -3311,6 +3311,14 @@
 <file path=ppt/slides/slide1.xml><?xml version="1.0" encoding="utf-8"?>
 <p:sld xmlns:a="http://schemas.openxmlformats.org/drawingml/2006/main" xmlns:r="http://schemas.openxmlformats.org/officeDocument/2006/relationships" xmlns:p="http://schemas.openxmlformats.org/presentationml/2006/main">
   <p:cSld>
+    <p:bg>
+      <p:bgPr>
+        <a:solidFill>
+          <a:srgbClr val="77AA77"/>
+        </a:solidFill>
+        <a:effectLst/>
+      </p:bgPr>
+    </p:bg>
     <p:spTree>
       <p:nvGrpSpPr>
         <p:cNvPr id="1" name=""/>
@@ -3341,40 +3349,27 @@
             <p:ph type="ctrTitle"/>
           </p:nvPr>
         </p:nvSpPr>
-        <p:spPr/>
-        <p:txBody>
-          <a:bodyPr/>
-          <a:lstStyle/>
-          <a:p>
-            <a:r>
-              <a:rPr lang="en-US" dirty="0"/>
+        <p:spPr>
+          <a:xfrm>
+            <a:off x="1524000" y="2884054"/>
+            <a:ext cx="9144000" cy="1089891"/>
+          </a:xfrm>
+        </p:spPr>
+        <p:txBody>
+          <a:bodyPr/>
+          <a:lstStyle/>
+          <a:p>
+            <a:r>
+              <a:rPr lang="en-US" dirty="0">
+                <a:solidFill>
+                  <a:schemeClr val="bg1"/>
+                </a:solidFill>
+                <a:latin typeface="Helvetica Neue" panose="02000503000000020004" pitchFamily="2" charset="0"/>
+                <a:ea typeface="Helvetica Neue" panose="02000503000000020004" pitchFamily="2" charset="0"/>
+                <a:cs typeface="Helvetica Neue" panose="02000503000000020004" pitchFamily="2" charset="0"/>
+              </a:rPr>
               <a:t>Movie Analysis</a:t>
             </a:r>
-          </a:p>
-        </p:txBody>
-      </p:sp>
-      <p:sp>
-        <p:nvSpPr>
-          <p:cNvPr id="3" name="Subtitle 2">
-            <a:extLst>
-              <a:ext uri="{FF2B5EF4-FFF2-40B4-BE49-F238E27FC236}">
-                <a16:creationId xmlns:a16="http://schemas.microsoft.com/office/drawing/2014/main" id="{9725A66B-E329-9AD3-1628-0AC30D5CA3C5}"/>
-              </a:ext>
-            </a:extLst>
-          </p:cNvPr>
-          <p:cNvSpPr>
-            <a:spLocks noGrp="1"/>
-          </p:cNvSpPr>
-          <p:nvPr>
-            <p:ph type="subTitle" idx="1"/>
-          </p:nvPr>
-        </p:nvSpPr>
-        <p:spPr/>
-        <p:txBody>
-          <a:bodyPr/>
-          <a:lstStyle/>
-          <a:p>
-            <a:endParaRPr lang="en-US"/>
           </a:p>
         </p:txBody>
       </p:sp>
@@ -3394,6 +3389,14 @@
 <file path=ppt/slides/slide2.xml><?xml version="1.0" encoding="utf-8"?>
 <p:sld xmlns:a="http://schemas.openxmlformats.org/drawingml/2006/main" xmlns:r="http://schemas.openxmlformats.org/officeDocument/2006/relationships" xmlns:p="http://schemas.openxmlformats.org/presentationml/2006/main">
   <p:cSld>
+    <p:bg>
+      <p:bgPr>
+        <a:solidFill>
+          <a:srgbClr val="77AA77"/>
+        </a:solidFill>
+        <a:effectLst/>
+      </p:bgPr>
+    </p:bg>
     <p:spTree>
       <p:nvGrpSpPr>
         <p:cNvPr id="1" name=""/>
@@ -3430,7 +3433,14 @@
           <a:lstStyle/>
           <a:p>
             <a:r>
-              <a:rPr lang="en-US" dirty="0"/>
+              <a:rPr lang="en-US" dirty="0">
+                <a:solidFill>
+                  <a:schemeClr val="bg1"/>
+                </a:solidFill>
+                <a:latin typeface="Helvetica Neue" panose="02000503000000020004" pitchFamily="2" charset="0"/>
+                <a:ea typeface="Helvetica Neue" panose="02000503000000020004" pitchFamily="2" charset="0"/>
+                <a:cs typeface="Helvetica Neue" panose="02000503000000020004" pitchFamily="2" charset="0"/>
+              </a:rPr>
               <a:t>Data Information</a:t>
             </a:r>
           </a:p>
@@ -3454,10 +3464,16 @@
         </p:nvSpPr>
         <p:spPr/>
         <p:txBody>
-          <a:bodyPr/>
-          <a:lstStyle/>
-          <a:p>
-            <a:endParaRPr lang="en-US"/>
+          <a:bodyPr>
+            <a:normAutofit/>
+          </a:bodyPr>
+          <a:lstStyle/>
+          <a:p>
+            <a:endParaRPr lang="en-US" sz="2400" dirty="0">
+              <a:solidFill>
+                <a:schemeClr val="bg1"/>
+              </a:solidFill>
+            </a:endParaRPr>
           </a:p>
         </p:txBody>
       </p:sp>
@@ -3477,6 +3493,14 @@
 <file path=ppt/slides/slide3.xml><?xml version="1.0" encoding="utf-8"?>
 <p:sld xmlns:a="http://schemas.openxmlformats.org/drawingml/2006/main" xmlns:r="http://schemas.openxmlformats.org/officeDocument/2006/relationships" xmlns:p="http://schemas.openxmlformats.org/presentationml/2006/main">
   <p:cSld>
+    <p:bg>
+      <p:bgPr>
+        <a:solidFill>
+          <a:srgbClr val="77AA77"/>
+        </a:solidFill>
+        <a:effectLst/>
+      </p:bgPr>
+    </p:bg>
     <p:spTree>
       <p:nvGrpSpPr>
         <p:cNvPr id="1" name=""/>
@@ -3513,37 +3537,48 @@
           <a:lstStyle/>
           <a:p>
             <a:r>
-              <a:rPr lang="en-US" dirty="0"/>
-              <a:t>Analysis Details 1</a:t>
-            </a:r>
-          </a:p>
-        </p:txBody>
-      </p:sp>
-      <p:sp>
-        <p:nvSpPr>
-          <p:cNvPr id="3" name="Content Placeholder 2">
-            <a:extLst>
-              <a:ext uri="{FF2B5EF4-FFF2-40B4-BE49-F238E27FC236}">
-                <a16:creationId xmlns:a16="http://schemas.microsoft.com/office/drawing/2014/main" id="{88626ED5-657D-6E28-2F85-282385255D24}"/>
-              </a:ext>
-            </a:extLst>
-          </p:cNvPr>
-          <p:cNvSpPr>
-            <a:spLocks noGrp="1"/>
-          </p:cNvSpPr>
+              <a:rPr lang="en-US" dirty="0">
+                <a:solidFill>
+                  <a:schemeClr val="bg1"/>
+                </a:solidFill>
+                <a:latin typeface="Helvetica Neue" panose="02000503000000020004" pitchFamily="2" charset="0"/>
+                <a:ea typeface="Helvetica Neue" panose="02000503000000020004" pitchFamily="2" charset="0"/>
+                <a:cs typeface="Helvetica Neue" panose="02000503000000020004" pitchFamily="2" charset="0"/>
+              </a:rPr>
+              <a:t>Analysis 1</a:t>
+            </a:r>
+          </a:p>
+        </p:txBody>
+      </p:sp>
+      <p:pic>
+        <p:nvPicPr>
+          <p:cNvPr id="5" name="Content Placeholder 4" descr="A graph with text on it&#10;&#10;AI-generated content may be incorrect.">
+            <a:extLst>
+              <a:ext uri="{FF2B5EF4-FFF2-40B4-BE49-F238E27FC236}">
+                <a16:creationId xmlns:a16="http://schemas.microsoft.com/office/drawing/2014/main" id="{3E39642B-6DCB-E064-091B-F18F8F090DA8}"/>
+              </a:ext>
+            </a:extLst>
+          </p:cNvPr>
+          <p:cNvPicPr>
+            <a:picLocks noGrp="1" noChangeAspect="1"/>
+          </p:cNvPicPr>
           <p:nvPr>
             <p:ph idx="1"/>
           </p:nvPr>
-        </p:nvSpPr>
-        <p:spPr/>
-        <p:txBody>
-          <a:bodyPr/>
-          <a:lstStyle/>
-          <a:p>
-            <a:endParaRPr lang="en-US"/>
-          </a:p>
-        </p:txBody>
-      </p:sp>
+        </p:nvPicPr>
+        <p:blipFill>
+          <a:blip r:embed="rId2"/>
+          <a:stretch>
+            <a:fillRect/>
+          </a:stretch>
+        </p:blipFill>
+        <p:spPr>
+          <a:xfrm>
+            <a:off x="1429563" y="1461030"/>
+            <a:ext cx="9332873" cy="5031845"/>
+          </a:xfrm>
+        </p:spPr>
+      </p:pic>
     </p:spTree>
     <p:extLst>
       <p:ext uri="{BB962C8B-B14F-4D97-AF65-F5344CB8AC3E}">
@@ -3560,6 +3595,14 @@
 <file path=ppt/slides/slide4.xml><?xml version="1.0" encoding="utf-8"?>
 <p:sld xmlns:a="http://schemas.openxmlformats.org/drawingml/2006/main" xmlns:r="http://schemas.openxmlformats.org/officeDocument/2006/relationships" xmlns:p="http://schemas.openxmlformats.org/presentationml/2006/main">
   <p:cSld>
+    <p:bg>
+      <p:bgPr>
+        <a:solidFill>
+          <a:srgbClr val="77AA77"/>
+        </a:solidFill>
+        <a:effectLst/>
+      </p:bgPr>
+    </p:bg>
     <p:spTree>
       <p:nvGrpSpPr>
         <p:cNvPr id="1" name=""/>
@@ -3596,37 +3639,48 @@
           <a:lstStyle/>
           <a:p>
             <a:r>
-              <a:rPr lang="en-US" dirty="0"/>
-              <a:t>Analysis</a:t>
-            </a:r>
-          </a:p>
-        </p:txBody>
-      </p:sp>
-      <p:sp>
-        <p:nvSpPr>
-          <p:cNvPr id="3" name="Content Placeholder 2">
-            <a:extLst>
-              <a:ext uri="{FF2B5EF4-FFF2-40B4-BE49-F238E27FC236}">
-                <a16:creationId xmlns:a16="http://schemas.microsoft.com/office/drawing/2014/main" id="{F5169F74-6932-BB0B-527F-0568B5E893AC}"/>
-              </a:ext>
-            </a:extLst>
-          </p:cNvPr>
-          <p:cNvSpPr>
-            <a:spLocks noGrp="1"/>
-          </p:cNvSpPr>
+              <a:rPr lang="en-US" dirty="0">
+                <a:solidFill>
+                  <a:schemeClr val="bg1"/>
+                </a:solidFill>
+                <a:latin typeface="Helvetica Neue" panose="02000503000000020004" pitchFamily="2" charset="0"/>
+                <a:ea typeface="Helvetica Neue" panose="02000503000000020004" pitchFamily="2" charset="0"/>
+                <a:cs typeface="Helvetica Neue" panose="02000503000000020004" pitchFamily="2" charset="0"/>
+              </a:rPr>
+              <a:t>Analysis 2</a:t>
+            </a:r>
+          </a:p>
+        </p:txBody>
+      </p:sp>
+      <p:pic>
+        <p:nvPicPr>
+          <p:cNvPr id="6" name="Content Placeholder 5" descr="A graph with green and white text&#10;&#10;AI-generated content may be incorrect.">
+            <a:extLst>
+              <a:ext uri="{FF2B5EF4-FFF2-40B4-BE49-F238E27FC236}">
+                <a16:creationId xmlns:a16="http://schemas.microsoft.com/office/drawing/2014/main" id="{64864825-AFC4-E089-85B7-5C26E4C66F5B}"/>
+              </a:ext>
+            </a:extLst>
+          </p:cNvPr>
+          <p:cNvPicPr>
+            <a:picLocks noGrp="1" noChangeAspect="1"/>
+          </p:cNvPicPr>
           <p:nvPr>
             <p:ph idx="1"/>
           </p:nvPr>
-        </p:nvSpPr>
-        <p:spPr/>
-        <p:txBody>
-          <a:bodyPr/>
-          <a:lstStyle/>
-          <a:p>
-            <a:endParaRPr lang="en-US"/>
-          </a:p>
-        </p:txBody>
-      </p:sp>
+        </p:nvPicPr>
+        <p:blipFill>
+          <a:blip r:embed="rId2"/>
+          <a:stretch>
+            <a:fillRect/>
+          </a:stretch>
+        </p:blipFill>
+        <p:spPr>
+          <a:xfrm>
+            <a:off x="2120965" y="1388533"/>
+            <a:ext cx="7950069" cy="5300046"/>
+          </a:xfrm>
+        </p:spPr>
+      </p:pic>
     </p:spTree>
     <p:extLst>
       <p:ext uri="{BB962C8B-B14F-4D97-AF65-F5344CB8AC3E}">
@@ -3643,6 +3697,14 @@
 <file path=ppt/slides/slide5.xml><?xml version="1.0" encoding="utf-8"?>
 <p:sld xmlns:a="http://schemas.openxmlformats.org/drawingml/2006/main" xmlns:r="http://schemas.openxmlformats.org/officeDocument/2006/relationships" xmlns:p="http://schemas.openxmlformats.org/presentationml/2006/main">
   <p:cSld>
+    <p:bg>
+      <p:bgPr>
+        <a:solidFill>
+          <a:srgbClr val="77AA77"/>
+        </a:solidFill>
+        <a:effectLst/>
+      </p:bgPr>
+    </p:bg>
     <p:spTree>
       <p:nvGrpSpPr>
         <p:cNvPr id="1" name=""/>
@@ -3679,7 +3741,14 @@
           <a:lstStyle/>
           <a:p>
             <a:r>
-              <a:rPr lang="en-US" dirty="0"/>
+              <a:rPr lang="en-US" dirty="0">
+                <a:solidFill>
+                  <a:schemeClr val="bg1"/>
+                </a:solidFill>
+                <a:latin typeface="Helvetica Neue" panose="02000503000000020004" pitchFamily="2" charset="0"/>
+                <a:ea typeface="Helvetica Neue" panose="02000503000000020004" pitchFamily="2" charset="0"/>
+                <a:cs typeface="Helvetica Neue" panose="02000503000000020004" pitchFamily="2" charset="0"/>
+              </a:rPr>
               <a:t>Conclusion</a:t>
             </a:r>
           </a:p>
@@ -3703,10 +3772,16 @@
         </p:nvSpPr>
         <p:spPr/>
         <p:txBody>
-          <a:bodyPr/>
-          <a:lstStyle/>
-          <a:p>
-            <a:endParaRPr lang="en-US"/>
+          <a:bodyPr>
+            <a:normAutofit/>
+          </a:bodyPr>
+          <a:lstStyle/>
+          <a:p>
+            <a:endParaRPr lang="en-US" sz="2400" dirty="0">
+              <a:solidFill>
+                <a:schemeClr val="bg1"/>
+              </a:solidFill>
+            </a:endParaRPr>
           </a:p>
         </p:txBody>
       </p:sp>

</xml_diff>

<commit_message>
1.1.2 - Break Time
</commit_message>
<xml_diff>
--- a/movie_presentation.pptx
+++ b/movie_presentation.pptx
@@ -4361,6 +4361,26 @@
           </a:bodyPr>
           <a:lstStyle/>
           <a:p>
+            <a:r>
+              <a:rPr lang="en-US" sz="2400" dirty="0">
+                <a:solidFill>
+                  <a:schemeClr val="bg1"/>
+                </a:solidFill>
+              </a:rPr>
+              <a:t>All movies have a runtime over 100mins and under 134mins.</a:t>
+            </a:r>
+          </a:p>
+          <a:p>
+            <a:r>
+              <a:rPr lang="en-US" sz="2400" dirty="0">
+                <a:solidFill>
+                  <a:schemeClr val="bg1"/>
+                </a:solidFill>
+              </a:rPr>
+              <a:t>The more a movie is nominated is the more likely it is to win.</a:t>
+            </a:r>
+          </a:p>
+          <a:p>
             <a:endParaRPr lang="en-US" sz="2400" dirty="0">
               <a:solidFill>
                 <a:schemeClr val="bg1"/>

</xml_diff>

<commit_message>
2.0 - Matplot Lib Theme Designed my own matplotlib theme in an attempt to make the code less dry. Refiend the presentation as well.
</commit_message>
<xml_diff>
--- a/movie_presentation.pptx
+++ b/movie_presentation.pptx
@@ -108,6 +108,11 @@
       </a:defRPr>
     </a:lvl9pPr>
   </p:defaultTextStyle>
+  <p:extLst>
+    <p:ext uri="{EFAFB233-063F-42B5-8137-9DF3F51BA10A}">
+      <p15:sldGuideLst xmlns:p15="http://schemas.microsoft.com/office/powerpoint/2012/main"/>
+    </p:ext>
+  </p:extLst>
 </p:presentation>
 </file>
 
@@ -258,7 +263,7 @@
           <a:p>
             <a:fld id="{09853AF6-0128-E44F-A593-FE50F8B84758}" type="datetimeFigureOut">
               <a:rPr lang="en-US" smtClean="0"/>
-              <a:t>3/13/25</a:t>
+              <a:t>3/17/25</a:t>
             </a:fld>
             <a:endParaRPr lang="en-US"/>
           </a:p>
@@ -456,7 +461,7 @@
           <a:p>
             <a:fld id="{09853AF6-0128-E44F-A593-FE50F8B84758}" type="datetimeFigureOut">
               <a:rPr lang="en-US" smtClean="0"/>
-              <a:t>3/13/25</a:t>
+              <a:t>3/17/25</a:t>
             </a:fld>
             <a:endParaRPr lang="en-US"/>
           </a:p>
@@ -664,7 +669,7 @@
           <a:p>
             <a:fld id="{09853AF6-0128-E44F-A593-FE50F8B84758}" type="datetimeFigureOut">
               <a:rPr lang="en-US" smtClean="0"/>
-              <a:t>3/13/25</a:t>
+              <a:t>3/17/25</a:t>
             </a:fld>
             <a:endParaRPr lang="en-US"/>
           </a:p>
@@ -862,7 +867,7 @@
           <a:p>
             <a:fld id="{09853AF6-0128-E44F-A593-FE50F8B84758}" type="datetimeFigureOut">
               <a:rPr lang="en-US" smtClean="0"/>
-              <a:t>3/13/25</a:t>
+              <a:t>3/17/25</a:t>
             </a:fld>
             <a:endParaRPr lang="en-US"/>
           </a:p>
@@ -1137,7 +1142,7 @@
           <a:p>
             <a:fld id="{09853AF6-0128-E44F-A593-FE50F8B84758}" type="datetimeFigureOut">
               <a:rPr lang="en-US" smtClean="0"/>
-              <a:t>3/13/25</a:t>
+              <a:t>3/17/25</a:t>
             </a:fld>
             <a:endParaRPr lang="en-US"/>
           </a:p>
@@ -1402,7 +1407,7 @@
           <a:p>
             <a:fld id="{09853AF6-0128-E44F-A593-FE50F8B84758}" type="datetimeFigureOut">
               <a:rPr lang="en-US" smtClean="0"/>
-              <a:t>3/13/25</a:t>
+              <a:t>3/17/25</a:t>
             </a:fld>
             <a:endParaRPr lang="en-US"/>
           </a:p>
@@ -1814,7 +1819,7 @@
           <a:p>
             <a:fld id="{09853AF6-0128-E44F-A593-FE50F8B84758}" type="datetimeFigureOut">
               <a:rPr lang="en-US" smtClean="0"/>
-              <a:t>3/13/25</a:t>
+              <a:t>3/17/25</a:t>
             </a:fld>
             <a:endParaRPr lang="en-US"/>
           </a:p>
@@ -1955,7 +1960,7 @@
           <a:p>
             <a:fld id="{09853AF6-0128-E44F-A593-FE50F8B84758}" type="datetimeFigureOut">
               <a:rPr lang="en-US" smtClean="0"/>
-              <a:t>3/13/25</a:t>
+              <a:t>3/17/25</a:t>
             </a:fld>
             <a:endParaRPr lang="en-US"/>
           </a:p>
@@ -2068,7 +2073,7 @@
           <a:p>
             <a:fld id="{09853AF6-0128-E44F-A593-FE50F8B84758}" type="datetimeFigureOut">
               <a:rPr lang="en-US" smtClean="0"/>
-              <a:t>3/13/25</a:t>
+              <a:t>3/17/25</a:t>
             </a:fld>
             <a:endParaRPr lang="en-US"/>
           </a:p>
@@ -2379,7 +2384,7 @@
           <a:p>
             <a:fld id="{09853AF6-0128-E44F-A593-FE50F8B84758}" type="datetimeFigureOut">
               <a:rPr lang="en-US" smtClean="0"/>
-              <a:t>3/13/25</a:t>
+              <a:t>3/17/25</a:t>
             </a:fld>
             <a:endParaRPr lang="en-US"/>
           </a:p>
@@ -2667,7 +2672,7 @@
           <a:p>
             <a:fld id="{09853AF6-0128-E44F-A593-FE50F8B84758}" type="datetimeFigureOut">
               <a:rPr lang="en-US" smtClean="0"/>
-              <a:t>3/13/25</a:t>
+              <a:t>3/17/25</a:t>
             </a:fld>
             <a:endParaRPr lang="en-US"/>
           </a:p>
@@ -2908,7 +2913,7 @@
           <a:p>
             <a:fld id="{09853AF6-0128-E44F-A593-FE50F8B84758}" type="datetimeFigureOut">
               <a:rPr lang="en-US" smtClean="0"/>
-              <a:t>3/13/25</a:t>
+              <a:t>3/17/25</a:t>
             </a:fld>
             <a:endParaRPr lang="en-US"/>
           </a:p>
@@ -3356,7 +3361,9 @@
           </a:xfrm>
         </p:spPr>
         <p:txBody>
-          <a:bodyPr/>
+          <a:bodyPr>
+            <a:normAutofit fontScale="90000"/>
+          </a:bodyPr>
           <a:lstStyle/>
           <a:p>
             <a:r>
@@ -3369,6 +3376,69 @@
                 <a:cs typeface="Helvetica Neue" panose="02000503000000020004" pitchFamily="2" charset="0"/>
               </a:rPr>
               <a:t>Movie Analysis</a:t>
+            </a:r>
+            <a:br>
+              <a:rPr lang="en-US" dirty="0">
+                <a:solidFill>
+                  <a:schemeClr val="bg1"/>
+                </a:solidFill>
+                <a:latin typeface="Helvetica Neue" panose="02000503000000020004" pitchFamily="2" charset="0"/>
+                <a:ea typeface="Helvetica Neue" panose="02000503000000020004" pitchFamily="2" charset="0"/>
+                <a:cs typeface="Helvetica Neue" panose="02000503000000020004" pitchFamily="2" charset="0"/>
+              </a:rPr>
+            </a:br>
+            <a:r>
+              <a:rPr lang="en-US" sz="3600" dirty="0">
+                <a:solidFill>
+                  <a:schemeClr val="bg1"/>
+                </a:solidFill>
+                <a:latin typeface="Helvetica Neue" panose="02000503000000020004" pitchFamily="2" charset="0"/>
+                <a:ea typeface="Helvetica Neue" panose="02000503000000020004" pitchFamily="2" charset="0"/>
+                <a:cs typeface="Helvetica Neue" panose="02000503000000020004" pitchFamily="2" charset="0"/>
+              </a:rPr>
+              <a:t>Trends &amp; Insights</a:t>
+            </a:r>
+          </a:p>
+        </p:txBody>
+      </p:sp>
+      <p:sp>
+        <p:nvSpPr>
+          <p:cNvPr id="3" name="TextBox 2">
+            <a:extLst>
+              <a:ext uri="{FF2B5EF4-FFF2-40B4-BE49-F238E27FC236}">
+                <a16:creationId xmlns:a16="http://schemas.microsoft.com/office/drawing/2014/main" id="{E41208AE-7527-D704-CAEA-C6BCB7038F29}"/>
+              </a:ext>
+            </a:extLst>
+          </p:cNvPr>
+          <p:cNvSpPr txBox="1"/>
+          <p:nvPr/>
+        </p:nvSpPr>
+        <p:spPr>
+          <a:xfrm>
+            <a:off x="5263079" y="4969565"/>
+            <a:ext cx="1665841" cy="369332"/>
+          </a:xfrm>
+          <a:prstGeom prst="rect">
+            <a:avLst/>
+          </a:prstGeom>
+          <a:noFill/>
+        </p:spPr>
+        <p:txBody>
+          <a:bodyPr wrap="none" rtlCol="0">
+            <a:spAutoFit/>
+          </a:bodyPr>
+          <a:lstStyle/>
+          <a:p>
+            <a:r>
+              <a:rPr lang="en-US" dirty="0">
+                <a:solidFill>
+                  <a:schemeClr val="bg1"/>
+                </a:solidFill>
+                <a:latin typeface="Helvetica Neue" panose="02000503000000020004" pitchFamily="2" charset="0"/>
+                <a:ea typeface="Helvetica Neue" panose="02000503000000020004" pitchFamily="2" charset="0"/>
+                <a:cs typeface="Helvetica Neue" panose="02000503000000020004" pitchFamily="2" charset="0"/>
+              </a:rPr>
+              <a:t>Dan McCahon</a:t>
             </a:r>
           </a:p>
         </p:txBody>
@@ -3441,7 +3511,7 @@
                 <a:ea typeface="Helvetica Neue" panose="02000503000000020004" pitchFamily="2" charset="0"/>
                 <a:cs typeface="Helvetica Neue" panose="02000503000000020004" pitchFamily="2" charset="0"/>
               </a:rPr>
-              <a:t>Data Used</a:t>
+              <a:t>Dataset Overview</a:t>
             </a:r>
           </a:p>
         </p:txBody>
@@ -3475,7 +3545,7 @@
           <a:lstStyle/>
           <a:p>
             <a:r>
-              <a:rPr lang="en-US" sz="2400" dirty="0">
+              <a:rPr lang="en-US" sz="3200" dirty="0">
                 <a:solidFill>
                   <a:schemeClr val="bg1"/>
                 </a:solidFill>
@@ -3483,12 +3553,12 @@
                 <a:ea typeface="Helvetica Neue" panose="02000503000000020004" pitchFamily="2" charset="0"/>
                 <a:cs typeface="Helvetica Neue" panose="02000503000000020004" pitchFamily="2" charset="0"/>
               </a:rPr>
-              <a:t>Ten selected movies were provided in a CSV file.</a:t>
-            </a:r>
-          </a:p>
-          <a:p>
-            <a:r>
-              <a:rPr lang="en-US" sz="2400" dirty="0">
+              <a:t>Source: OMDb API</a:t>
+            </a:r>
+          </a:p>
+          <a:p>
+            <a:r>
+              <a:rPr lang="en-US" sz="3200" dirty="0">
                 <a:solidFill>
                   <a:schemeClr val="bg1"/>
                 </a:solidFill>
@@ -3496,12 +3566,12 @@
                 <a:ea typeface="Helvetica Neue" panose="02000503000000020004" pitchFamily="2" charset="0"/>
                 <a:cs typeface="Helvetica Neue" panose="02000503000000020004" pitchFamily="2" charset="0"/>
               </a:rPr>
-              <a:t>The selected movies data was retrieved from OMBd’s API</a:t>
-            </a:r>
-          </a:p>
-          <a:p>
-            <a:r>
-              <a:rPr lang="en-US" sz="2400" dirty="0">
+              <a:t>Size: 15 movies via csv files</a:t>
+            </a:r>
+          </a:p>
+          <a:p>
+            <a:r>
+              <a:rPr lang="en-US" sz="3200" dirty="0">
                 <a:solidFill>
                   <a:schemeClr val="bg1"/>
                 </a:solidFill>
@@ -3509,13 +3579,12 @@
                 <a:ea typeface="Helvetica Neue" panose="02000503000000020004" pitchFamily="2" charset="0"/>
                 <a:cs typeface="Helvetica Neue" panose="02000503000000020004" pitchFamily="2" charset="0"/>
               </a:rPr>
-              <a:t>The Data Included:</a:t>
-            </a:r>
-          </a:p>
-          <a:p>
-            <a:pPr lvl="1"/>
-            <a:r>
-              <a:rPr lang="en-US" dirty="0">
+              <a:t>Featured: Movie Title, Runtime, Genre, Award Wins, Award Nominations, Box Office, Director, Language, Plot</a:t>
+            </a:r>
+          </a:p>
+          <a:p>
+            <a:r>
+              <a:rPr lang="en-US" sz="3200" dirty="0">
                 <a:solidFill>
                   <a:schemeClr val="bg1"/>
                 </a:solidFill>
@@ -3523,77 +3592,7 @@
                 <a:ea typeface="Helvetica Neue" panose="02000503000000020004" pitchFamily="2" charset="0"/>
                 <a:cs typeface="Helvetica Neue" panose="02000503000000020004" pitchFamily="2" charset="0"/>
               </a:rPr>
-              <a:t>Movie Title</a:t>
-            </a:r>
-          </a:p>
-          <a:p>
-            <a:pPr lvl="1"/>
-            <a:r>
-              <a:rPr lang="en-US" dirty="0">
-                <a:solidFill>
-                  <a:schemeClr val="bg1"/>
-                </a:solidFill>
-                <a:latin typeface="Helvetica Neue" panose="02000503000000020004" pitchFamily="2" charset="0"/>
-                <a:ea typeface="Helvetica Neue" panose="02000503000000020004" pitchFamily="2" charset="0"/>
-                <a:cs typeface="Helvetica Neue" panose="02000503000000020004" pitchFamily="2" charset="0"/>
-              </a:rPr>
-              <a:t>Runtime</a:t>
-            </a:r>
-          </a:p>
-          <a:p>
-            <a:pPr lvl="1"/>
-            <a:r>
-              <a:rPr lang="en-US" dirty="0">
-                <a:solidFill>
-                  <a:schemeClr val="bg1"/>
-                </a:solidFill>
-                <a:latin typeface="Helvetica Neue" panose="02000503000000020004" pitchFamily="2" charset="0"/>
-                <a:ea typeface="Helvetica Neue" panose="02000503000000020004" pitchFamily="2" charset="0"/>
-                <a:cs typeface="Helvetica Neue" panose="02000503000000020004" pitchFamily="2" charset="0"/>
-              </a:rPr>
-              <a:t>Genre</a:t>
-            </a:r>
-          </a:p>
-          <a:p>
-            <a:pPr lvl="1"/>
-            <a:r>
-              <a:rPr lang="en-US" dirty="0">
-                <a:solidFill>
-                  <a:schemeClr val="bg1"/>
-                </a:solidFill>
-                <a:latin typeface="Helvetica Neue" panose="02000503000000020004" pitchFamily="2" charset="0"/>
-                <a:ea typeface="Helvetica Neue" panose="02000503000000020004" pitchFamily="2" charset="0"/>
-                <a:cs typeface="Helvetica Neue" panose="02000503000000020004" pitchFamily="2" charset="0"/>
-              </a:rPr>
-              <a:t>Award Wins</a:t>
-            </a:r>
-          </a:p>
-          <a:p>
-            <a:pPr lvl="1"/>
-            <a:r>
-              <a:rPr lang="en-US" dirty="0">
-                <a:solidFill>
-                  <a:schemeClr val="bg1"/>
-                </a:solidFill>
-                <a:latin typeface="Helvetica Neue" panose="02000503000000020004" pitchFamily="2" charset="0"/>
-                <a:ea typeface="Helvetica Neue" panose="02000503000000020004" pitchFamily="2" charset="0"/>
-                <a:cs typeface="Helvetica Neue" panose="02000503000000020004" pitchFamily="2" charset="0"/>
-              </a:rPr>
-              <a:t>Award Nominations</a:t>
-            </a:r>
-          </a:p>
-          <a:p>
-            <a:pPr lvl="1"/>
-            <a:r>
-              <a:rPr lang="en-US" dirty="0">
-                <a:solidFill>
-                  <a:schemeClr val="bg1"/>
-                </a:solidFill>
-                <a:latin typeface="Helvetica Neue" panose="02000503000000020004" pitchFamily="2" charset="0"/>
-                <a:ea typeface="Helvetica Neue" panose="02000503000000020004" pitchFamily="2" charset="0"/>
-                <a:cs typeface="Helvetica Neue" panose="02000503000000020004" pitchFamily="2" charset="0"/>
-              </a:rPr>
-              <a:t>Box Office</a:t>
+              <a:t>Libraries, Requests, CSV, Pandas, Matplotlib, Regex</a:t>
             </a:r>
           </a:p>
         </p:txBody>
@@ -3671,17 +3670,185 @@
                 <a:ea typeface="Helvetica Neue" panose="02000503000000020004" pitchFamily="2" charset="0"/>
                 <a:cs typeface="Helvetica Neue" panose="02000503000000020004" pitchFamily="2" charset="0"/>
               </a:rPr>
-              <a:t>Analysis 1: Runtimes</a:t>
+              <a:t>Key Insights</a:t>
+            </a:r>
+          </a:p>
+        </p:txBody>
+      </p:sp>
+      <p:sp>
+        <p:nvSpPr>
+          <p:cNvPr id="10" name="Content Placeholder 2">
+            <a:extLst>
+              <a:ext uri="{FF2B5EF4-FFF2-40B4-BE49-F238E27FC236}">
+                <a16:creationId xmlns:a16="http://schemas.microsoft.com/office/drawing/2014/main" id="{68C445AA-DB45-1D81-FCE5-198E94CF7E85}"/>
+              </a:ext>
+            </a:extLst>
+          </p:cNvPr>
+          <p:cNvSpPr>
+            <a:spLocks noGrp="1"/>
+          </p:cNvSpPr>
+          <p:nvPr>
+            <p:ph idx="1"/>
+          </p:nvPr>
+        </p:nvSpPr>
+        <p:spPr>
+          <a:xfrm>
+            <a:off x="838200" y="1690689"/>
+            <a:ext cx="10515600" cy="4676244"/>
+          </a:xfrm>
+        </p:spPr>
+        <p:txBody>
+          <a:bodyPr>
+            <a:normAutofit/>
+          </a:bodyPr>
+          <a:lstStyle/>
+          <a:p>
+            <a:r>
+              <a:rPr lang="en-US" sz="3200" dirty="0">
+                <a:solidFill>
+                  <a:schemeClr val="bg1"/>
+                </a:solidFill>
+                <a:latin typeface="Helvetica Neue" panose="02000503000000020004" pitchFamily="2" charset="0"/>
+                <a:ea typeface="Helvetica Neue" panose="02000503000000020004" pitchFamily="2" charset="0"/>
+                <a:cs typeface="Helvetica Neue" panose="02000503000000020004" pitchFamily="2" charset="0"/>
+              </a:rPr>
+              <a:t>Positive linear correlation of 0.60 between runtime and award wins. This moderate positive correlation suggests that as a movie’s runtime increases, it tends to win more awards.</a:t>
+            </a:r>
+          </a:p>
+          <a:p>
+            <a:r>
+              <a:rPr lang="en-US" sz="3200" dirty="0">
+                <a:solidFill>
+                  <a:schemeClr val="bg1"/>
+                </a:solidFill>
+                <a:latin typeface="Helvetica Neue" panose="02000503000000020004" pitchFamily="2" charset="0"/>
+                <a:ea typeface="Helvetica Neue" panose="02000503000000020004" pitchFamily="2" charset="0"/>
+                <a:cs typeface="Helvetica Neue" panose="02000503000000020004" pitchFamily="2" charset="0"/>
+              </a:rPr>
+              <a:t>Weak positive correlation of 0.19 between the amount of box office earnings a movie had and the number of nominations it received.</a:t>
+            </a:r>
+          </a:p>
+          <a:p>
+            <a:pPr>
+              <a:lnSpc>
+                <a:spcPts val="1350"/>
+              </a:lnSpc>
+            </a:pPr>
+            <a:endParaRPr lang="en-CA" sz="1400" b="0" dirty="0">
+              <a:solidFill>
+                <a:srgbClr val="3B3B3B"/>
+              </a:solidFill>
+              <a:effectLst/>
+              <a:latin typeface="Menlo" panose="020B0609030804020204" pitchFamily="49" charset="0"/>
+            </a:endParaRPr>
+          </a:p>
+        </p:txBody>
+      </p:sp>
+    </p:spTree>
+    <p:extLst>
+      <p:ext uri="{BB962C8B-B14F-4D97-AF65-F5344CB8AC3E}">
+        <p14:creationId xmlns:p14="http://schemas.microsoft.com/office/powerpoint/2010/main" val="3955099336"/>
+      </p:ext>
+    </p:extLst>
+  </p:cSld>
+  <p:clrMapOvr>
+    <a:masterClrMapping/>
+  </p:clrMapOvr>
+</p:sld>
+</file>
+
+<file path=ppt/slides/slide4.xml><?xml version="1.0" encoding="utf-8"?>
+<p:sld xmlns:a="http://schemas.openxmlformats.org/drawingml/2006/main" xmlns:r="http://schemas.openxmlformats.org/officeDocument/2006/relationships" xmlns:p="http://schemas.openxmlformats.org/presentationml/2006/main">
+  <p:cSld>
+    <p:bg>
+      <p:bgPr>
+        <a:solidFill>
+          <a:srgbClr val="77AA77"/>
+        </a:solidFill>
+        <a:effectLst/>
+      </p:bgPr>
+    </p:bg>
+    <p:spTree>
+      <p:nvGrpSpPr>
+        <p:cNvPr id="1" name=""/>
+        <p:cNvGrpSpPr/>
+        <p:nvPr/>
+      </p:nvGrpSpPr>
+      <p:grpSpPr>
+        <a:xfrm>
+          <a:off x="0" y="0"/>
+          <a:ext cx="0" cy="0"/>
+          <a:chOff x="0" y="0"/>
+          <a:chExt cx="0" cy="0"/>
+        </a:xfrm>
+      </p:grpSpPr>
+      <p:sp>
+        <p:nvSpPr>
+          <p:cNvPr id="9" name="Title 1">
+            <a:extLst>
+              <a:ext uri="{FF2B5EF4-FFF2-40B4-BE49-F238E27FC236}">
+                <a16:creationId xmlns:a16="http://schemas.microsoft.com/office/drawing/2014/main" id="{D28CC46F-BFF5-9242-7B5B-CF15D3648D5B}"/>
+              </a:ext>
+            </a:extLst>
+          </p:cNvPr>
+          <p:cNvSpPr txBox="1">
+            <a:spLocks/>
+          </p:cNvSpPr>
+          <p:nvPr/>
+        </p:nvSpPr>
+        <p:spPr>
+          <a:xfrm>
+            <a:off x="838200" y="365125"/>
+            <a:ext cx="10515600" cy="885297"/>
+          </a:xfrm>
+          <a:prstGeom prst="rect">
+            <a:avLst/>
+          </a:prstGeom>
+        </p:spPr>
+        <p:txBody>
+          <a:bodyPr vert="horz" lIns="91440" tIns="45720" rIns="91440" bIns="45720" rtlCol="0" anchor="ctr">
+            <a:normAutofit/>
+          </a:bodyPr>
+          <a:lstStyle>
+            <a:lvl1pPr algn="l" defTabSz="914400" rtl="0" eaLnBrk="1" latinLnBrk="0" hangingPunct="1">
+              <a:lnSpc>
+                <a:spcPct val="90000"/>
+              </a:lnSpc>
+              <a:spcBef>
+                <a:spcPct val="0"/>
+              </a:spcBef>
+              <a:buNone/>
+              <a:defRPr sz="4400" kern="1200">
+                <a:solidFill>
+                  <a:schemeClr val="tx1"/>
+                </a:solidFill>
+                <a:latin typeface="+mj-lt"/>
+                <a:ea typeface="+mj-ea"/>
+                <a:cs typeface="+mj-cs"/>
+              </a:defRPr>
+            </a:lvl1pPr>
+          </a:lstStyle>
+          <a:p>
+            <a:r>
+              <a:rPr lang="en-US" dirty="0">
+                <a:solidFill>
+                  <a:schemeClr val="bg1"/>
+                </a:solidFill>
+                <a:latin typeface="Helvetica Neue" panose="02000503000000020004" pitchFamily="2" charset="0"/>
+                <a:ea typeface="Helvetica Neue" panose="02000503000000020004" pitchFamily="2" charset="0"/>
+                <a:cs typeface="Helvetica Neue" panose="02000503000000020004" pitchFamily="2" charset="0"/>
+              </a:rPr>
+              <a:t>Key Insights</a:t>
             </a:r>
           </a:p>
         </p:txBody>
       </p:sp>
       <p:pic>
         <p:nvPicPr>
-          <p:cNvPr id="5" name="Content Placeholder 4" descr="A graph with text on it&#10;&#10;AI-generated content may be incorrect.">
-            <a:extLst>
-              <a:ext uri="{FF2B5EF4-FFF2-40B4-BE49-F238E27FC236}">
-                <a16:creationId xmlns:a16="http://schemas.microsoft.com/office/drawing/2014/main" id="{3E39642B-6DCB-E064-091B-F18F8F090DA8}"/>
+          <p:cNvPr id="7" name="Content Placeholder 6" descr="A graph with green bars&#10;&#10;AI-generated content may be incorrect.">
+            <a:extLst>
+              <a:ext uri="{FF2B5EF4-FFF2-40B4-BE49-F238E27FC236}">
+                <a16:creationId xmlns:a16="http://schemas.microsoft.com/office/drawing/2014/main" id="{54D9A1B7-C083-FCA8-443E-F53A4D9256FC}"/>
               </a:ext>
             </a:extLst>
           </p:cNvPr>
@@ -3700,8 +3867,8 @@
         </p:blipFill>
         <p:spPr>
           <a:xfrm>
-            <a:off x="3369733" y="1470555"/>
-            <a:ext cx="8442569" cy="4473046"/>
+            <a:off x="5446643" y="1557973"/>
+            <a:ext cx="6308036" cy="3742054"/>
           </a:xfrm>
         </p:spPr>
       </p:pic>
@@ -3710,7 +3877,7 @@
           <p:cNvPr id="8" name="Content Placeholder 2">
             <a:extLst>
               <a:ext uri="{FF2B5EF4-FFF2-40B4-BE49-F238E27FC236}">
-                <a16:creationId xmlns:a16="http://schemas.microsoft.com/office/drawing/2014/main" id="{0899EE22-314E-0DD6-7629-F76DC1871E65}"/>
+                <a16:creationId xmlns:a16="http://schemas.microsoft.com/office/drawing/2014/main" id="{28173B81-7AB3-9820-7B3D-896A390DF862}"/>
               </a:ext>
             </a:extLst>
           </p:cNvPr>
@@ -3721,8 +3888,8 @@
         </p:nvSpPr>
         <p:spPr>
           <a:xfrm>
-            <a:off x="838200" y="1683545"/>
-            <a:ext cx="2700867" cy="4047066"/>
+            <a:off x="838201" y="1690689"/>
+            <a:ext cx="4330148" cy="4020998"/>
           </a:xfrm>
           <a:prstGeom prst="rect">
             <a:avLst/>
@@ -3897,11 +4064,8 @@
             </a:lvl9pPr>
           </a:lstStyle>
           <a:p>
-            <a:pPr marL="0" indent="0">
-              <a:buNone/>
-            </a:pPr>
-            <a:r>
-              <a:rPr lang="en-US" sz="2400" dirty="0">
+            <a:r>
+              <a:rPr lang="en-US" sz="3200" dirty="0">
                 <a:solidFill>
                   <a:schemeClr val="bg1"/>
                 </a:solidFill>
@@ -3909,98 +4073,12 @@
                 <a:ea typeface="Helvetica Neue" panose="02000503000000020004" pitchFamily="2" charset="0"/>
                 <a:cs typeface="Helvetica Neue" panose="02000503000000020004" pitchFamily="2" charset="0"/>
               </a:rPr>
-              <a:t>The movie with the longest runtime is 12 Years a Slave, with a runtime of 134 minutes.</a:t>
-            </a:r>
-          </a:p>
-        </p:txBody>
-      </p:sp>
-    </p:spTree>
-    <p:extLst>
-      <p:ext uri="{BB962C8B-B14F-4D97-AF65-F5344CB8AC3E}">
-        <p14:creationId xmlns:p14="http://schemas.microsoft.com/office/powerpoint/2010/main" val="3955099336"/>
-      </p:ext>
-    </p:extLst>
-  </p:cSld>
-  <p:clrMapOvr>
-    <a:masterClrMapping/>
-  </p:clrMapOvr>
-</p:sld>
-</file>
-
-<file path=ppt/slides/slide4.xml><?xml version="1.0" encoding="utf-8"?>
-<p:sld xmlns:a="http://schemas.openxmlformats.org/drawingml/2006/main" xmlns:r="http://schemas.openxmlformats.org/officeDocument/2006/relationships" xmlns:p="http://schemas.openxmlformats.org/presentationml/2006/main">
-  <p:cSld>
-    <p:bg>
-      <p:bgPr>
-        <a:solidFill>
-          <a:srgbClr val="77AA77"/>
-        </a:solidFill>
-        <a:effectLst/>
-      </p:bgPr>
-    </p:bg>
-    <p:spTree>
-      <p:nvGrpSpPr>
-        <p:cNvPr id="1" name=""/>
-        <p:cNvGrpSpPr/>
-        <p:nvPr/>
-      </p:nvGrpSpPr>
-      <p:grpSpPr>
-        <a:xfrm>
-          <a:off x="0" y="0"/>
-          <a:ext cx="0" cy="0"/>
-          <a:chOff x="0" y="0"/>
-          <a:chExt cx="0" cy="0"/>
-        </a:xfrm>
-      </p:grpSpPr>
-      <p:sp>
-        <p:nvSpPr>
-          <p:cNvPr id="9" name="Title 1">
-            <a:extLst>
-              <a:ext uri="{FF2B5EF4-FFF2-40B4-BE49-F238E27FC236}">
-                <a16:creationId xmlns:a16="http://schemas.microsoft.com/office/drawing/2014/main" id="{D28CC46F-BFF5-9242-7B5B-CF15D3648D5B}"/>
-              </a:ext>
-            </a:extLst>
-          </p:cNvPr>
-          <p:cNvSpPr txBox="1">
-            <a:spLocks/>
-          </p:cNvSpPr>
-          <p:nvPr/>
-        </p:nvSpPr>
-        <p:spPr>
-          <a:xfrm>
-            <a:off x="838200" y="365125"/>
-            <a:ext cx="10515600" cy="885297"/>
-          </a:xfrm>
-          <a:prstGeom prst="rect">
-            <a:avLst/>
-          </a:prstGeom>
-        </p:spPr>
-        <p:txBody>
-          <a:bodyPr vert="horz" lIns="91440" tIns="45720" rIns="91440" bIns="45720" rtlCol="0" anchor="ctr">
-            <a:normAutofit/>
-          </a:bodyPr>
-          <a:lstStyle>
-            <a:lvl1pPr algn="l" defTabSz="914400" rtl="0" eaLnBrk="1" latinLnBrk="0" hangingPunct="1">
-              <a:lnSpc>
-                <a:spcPct val="90000"/>
-              </a:lnSpc>
-              <a:spcBef>
-                <a:spcPct val="0"/>
-              </a:spcBef>
-              <a:buNone/>
-              <a:defRPr sz="4400" kern="1200">
-                <a:solidFill>
-                  <a:schemeClr val="tx1"/>
-                </a:solidFill>
-                <a:latin typeface="+mj-lt"/>
-                <a:ea typeface="+mj-ea"/>
-                <a:cs typeface="+mj-cs"/>
-              </a:defRPr>
-            </a:lvl1pPr>
-          </a:lstStyle>
-          <a:p>
-            <a:r>
-              <a:rPr lang="en-US" dirty="0">
+              <a:t>The genres in the data sorted by volume of content. </a:t>
+            </a:r>
+          </a:p>
+          <a:p>
+            <a:r>
+              <a:rPr lang="en-US" sz="3200" dirty="0">
                 <a:solidFill>
                   <a:schemeClr val="bg1"/>
                 </a:solidFill>
@@ -4008,260 +4086,16 @@
                 <a:ea typeface="Helvetica Neue" panose="02000503000000020004" pitchFamily="2" charset="0"/>
                 <a:cs typeface="Helvetica Neue" panose="02000503000000020004" pitchFamily="2" charset="0"/>
               </a:rPr>
-              <a:t>Analysis 2: Nominations vs Wins</a:t>
-            </a:r>
-          </a:p>
-        </p:txBody>
-      </p:sp>
-      <p:pic>
-        <p:nvPicPr>
-          <p:cNvPr id="13" name="Content Placeholder 12" descr="A graph with a line and text&#10;&#10;AI-generated content may be incorrect.">
-            <a:extLst>
-              <a:ext uri="{FF2B5EF4-FFF2-40B4-BE49-F238E27FC236}">
-                <a16:creationId xmlns:a16="http://schemas.microsoft.com/office/drawing/2014/main" id="{48032CA5-0C1D-1B80-4B35-DA6CF8F0DD59}"/>
-              </a:ext>
-            </a:extLst>
-          </p:cNvPr>
-          <p:cNvPicPr>
-            <a:picLocks noGrp="1" noChangeAspect="1"/>
-          </p:cNvPicPr>
-          <p:nvPr>
-            <p:ph idx="1"/>
-          </p:nvPr>
-        </p:nvPicPr>
-        <p:blipFill>
-          <a:blip r:embed="rId2"/>
-          <a:stretch>
-            <a:fillRect/>
-          </a:stretch>
-        </p:blipFill>
-        <p:spPr>
-          <a:xfrm>
-            <a:off x="4430364" y="1253331"/>
-            <a:ext cx="7293671" cy="4351338"/>
-          </a:xfrm>
-        </p:spPr>
-      </p:pic>
-      <p:sp>
-        <p:nvSpPr>
-          <p:cNvPr id="14" name="Content Placeholder 2">
-            <a:extLst>
-              <a:ext uri="{FF2B5EF4-FFF2-40B4-BE49-F238E27FC236}">
-                <a16:creationId xmlns:a16="http://schemas.microsoft.com/office/drawing/2014/main" id="{51B8C668-9509-A7D3-5D61-3517744F3395}"/>
-              </a:ext>
-            </a:extLst>
-          </p:cNvPr>
-          <p:cNvSpPr txBox="1">
-            <a:spLocks/>
-          </p:cNvSpPr>
-          <p:nvPr/>
-        </p:nvSpPr>
-        <p:spPr>
-          <a:xfrm>
-            <a:off x="838200" y="1385358"/>
-            <a:ext cx="3412067" cy="4351338"/>
-          </a:xfrm>
-          <a:prstGeom prst="rect">
-            <a:avLst/>
-          </a:prstGeom>
-        </p:spPr>
-        <p:txBody>
-          <a:bodyPr vert="horz" lIns="91440" tIns="45720" rIns="91440" bIns="45720" rtlCol="0">
-            <a:normAutofit/>
-          </a:bodyPr>
-          <a:lstStyle>
-            <a:lvl1pPr marL="228600" indent="-228600" algn="l" defTabSz="914400" rtl="0" eaLnBrk="1" latinLnBrk="0" hangingPunct="1">
-              <a:lnSpc>
-                <a:spcPct val="90000"/>
-              </a:lnSpc>
-              <a:spcBef>
-                <a:spcPts val="1000"/>
-              </a:spcBef>
-              <a:buFont typeface="Arial" panose="020B0604020202020204" pitchFamily="34" charset="0"/>
-              <a:buChar char="•"/>
-              <a:defRPr sz="2800" kern="1200">
-                <a:solidFill>
-                  <a:schemeClr val="tx1"/>
-                </a:solidFill>
-                <a:latin typeface="+mn-lt"/>
-                <a:ea typeface="+mn-ea"/>
-                <a:cs typeface="+mn-cs"/>
-              </a:defRPr>
-            </a:lvl1pPr>
-            <a:lvl2pPr marL="685800" indent="-228600" algn="l" defTabSz="914400" rtl="0" eaLnBrk="1" latinLnBrk="0" hangingPunct="1">
-              <a:lnSpc>
-                <a:spcPct val="90000"/>
-              </a:lnSpc>
-              <a:spcBef>
-                <a:spcPts val="500"/>
-              </a:spcBef>
-              <a:buFont typeface="Arial" panose="020B0604020202020204" pitchFamily="34" charset="0"/>
-              <a:buChar char="•"/>
-              <a:defRPr sz="2400" kern="1200">
-                <a:solidFill>
-                  <a:schemeClr val="tx1"/>
-                </a:solidFill>
-                <a:latin typeface="+mn-lt"/>
-                <a:ea typeface="+mn-ea"/>
-                <a:cs typeface="+mn-cs"/>
-              </a:defRPr>
-            </a:lvl2pPr>
-            <a:lvl3pPr marL="1143000" indent="-228600" algn="l" defTabSz="914400" rtl="0" eaLnBrk="1" latinLnBrk="0" hangingPunct="1">
-              <a:lnSpc>
-                <a:spcPct val="90000"/>
-              </a:lnSpc>
-              <a:spcBef>
-                <a:spcPts val="500"/>
-              </a:spcBef>
-              <a:buFont typeface="Arial" panose="020B0604020202020204" pitchFamily="34" charset="0"/>
-              <a:buChar char="•"/>
-              <a:defRPr sz="2000" kern="1200">
-                <a:solidFill>
-                  <a:schemeClr val="tx1"/>
-                </a:solidFill>
-                <a:latin typeface="+mn-lt"/>
-                <a:ea typeface="+mn-ea"/>
-                <a:cs typeface="+mn-cs"/>
-              </a:defRPr>
-            </a:lvl3pPr>
-            <a:lvl4pPr marL="1600200" indent="-228600" algn="l" defTabSz="914400" rtl="0" eaLnBrk="1" latinLnBrk="0" hangingPunct="1">
-              <a:lnSpc>
-                <a:spcPct val="90000"/>
-              </a:lnSpc>
-              <a:spcBef>
-                <a:spcPts val="500"/>
-              </a:spcBef>
-              <a:buFont typeface="Arial" panose="020B0604020202020204" pitchFamily="34" charset="0"/>
-              <a:buChar char="•"/>
-              <a:defRPr sz="1800" kern="1200">
-                <a:solidFill>
-                  <a:schemeClr val="tx1"/>
-                </a:solidFill>
-                <a:latin typeface="+mn-lt"/>
-                <a:ea typeface="+mn-ea"/>
-                <a:cs typeface="+mn-cs"/>
-              </a:defRPr>
-            </a:lvl4pPr>
-            <a:lvl5pPr marL="2057400" indent="-228600" algn="l" defTabSz="914400" rtl="0" eaLnBrk="1" latinLnBrk="0" hangingPunct="1">
-              <a:lnSpc>
-                <a:spcPct val="90000"/>
-              </a:lnSpc>
-              <a:spcBef>
-                <a:spcPts val="500"/>
-              </a:spcBef>
-              <a:buFont typeface="Arial" panose="020B0604020202020204" pitchFamily="34" charset="0"/>
-              <a:buChar char="•"/>
-              <a:defRPr sz="1800" kern="1200">
-                <a:solidFill>
-                  <a:schemeClr val="tx1"/>
-                </a:solidFill>
-                <a:latin typeface="+mn-lt"/>
-                <a:ea typeface="+mn-ea"/>
-                <a:cs typeface="+mn-cs"/>
-              </a:defRPr>
-            </a:lvl5pPr>
-            <a:lvl6pPr marL="2514600" indent="-228600" algn="l" defTabSz="914400" rtl="0" eaLnBrk="1" latinLnBrk="0" hangingPunct="1">
-              <a:lnSpc>
-                <a:spcPct val="90000"/>
-              </a:lnSpc>
-              <a:spcBef>
-                <a:spcPts val="500"/>
-              </a:spcBef>
-              <a:buFont typeface="Arial" panose="020B0604020202020204" pitchFamily="34" charset="0"/>
-              <a:buChar char="•"/>
-              <a:defRPr sz="1800" kern="1200">
-                <a:solidFill>
-                  <a:schemeClr val="tx1"/>
-                </a:solidFill>
-                <a:latin typeface="+mn-lt"/>
-                <a:ea typeface="+mn-ea"/>
-                <a:cs typeface="+mn-cs"/>
-              </a:defRPr>
-            </a:lvl6pPr>
-            <a:lvl7pPr marL="2971800" indent="-228600" algn="l" defTabSz="914400" rtl="0" eaLnBrk="1" latinLnBrk="0" hangingPunct="1">
-              <a:lnSpc>
-                <a:spcPct val="90000"/>
-              </a:lnSpc>
-              <a:spcBef>
-                <a:spcPts val="500"/>
-              </a:spcBef>
-              <a:buFont typeface="Arial" panose="020B0604020202020204" pitchFamily="34" charset="0"/>
-              <a:buChar char="•"/>
-              <a:defRPr sz="1800" kern="1200">
-                <a:solidFill>
-                  <a:schemeClr val="tx1"/>
-                </a:solidFill>
-                <a:latin typeface="+mn-lt"/>
-                <a:ea typeface="+mn-ea"/>
-                <a:cs typeface="+mn-cs"/>
-              </a:defRPr>
-            </a:lvl7pPr>
-            <a:lvl8pPr marL="3429000" indent="-228600" algn="l" defTabSz="914400" rtl="0" eaLnBrk="1" latinLnBrk="0" hangingPunct="1">
-              <a:lnSpc>
-                <a:spcPct val="90000"/>
-              </a:lnSpc>
-              <a:spcBef>
-                <a:spcPts val="500"/>
-              </a:spcBef>
-              <a:buFont typeface="Arial" panose="020B0604020202020204" pitchFamily="34" charset="0"/>
-              <a:buChar char="•"/>
-              <a:defRPr sz="1800" kern="1200">
-                <a:solidFill>
-                  <a:schemeClr val="tx1"/>
-                </a:solidFill>
-                <a:latin typeface="+mn-lt"/>
-                <a:ea typeface="+mn-ea"/>
-                <a:cs typeface="+mn-cs"/>
-              </a:defRPr>
-            </a:lvl8pPr>
-            <a:lvl9pPr marL="3886200" indent="-228600" algn="l" defTabSz="914400" rtl="0" eaLnBrk="1" latinLnBrk="0" hangingPunct="1">
-              <a:lnSpc>
-                <a:spcPct val="90000"/>
-              </a:lnSpc>
-              <a:spcBef>
-                <a:spcPts val="500"/>
-              </a:spcBef>
-              <a:buFont typeface="Arial" panose="020B0604020202020204" pitchFamily="34" charset="0"/>
-              <a:buChar char="•"/>
-              <a:defRPr sz="1800" kern="1200">
-                <a:solidFill>
-                  <a:schemeClr val="tx1"/>
-                </a:solidFill>
-                <a:latin typeface="+mn-lt"/>
-                <a:ea typeface="+mn-ea"/>
-                <a:cs typeface="+mn-cs"/>
-              </a:defRPr>
-            </a:lvl9pPr>
-          </a:lstStyle>
-          <a:p>
-            <a:r>
-              <a:rPr lang="en-US" sz="2400" dirty="0">
-                <a:solidFill>
-                  <a:schemeClr val="bg1"/>
-                </a:solidFill>
-              </a:rPr>
-              <a:t>0.66 correlation, a moderately strong positive relationship.</a:t>
-            </a:r>
-          </a:p>
-          <a:p>
-            <a:r>
-              <a:rPr lang="en-US" sz="2400" dirty="0">
-                <a:solidFill>
-                  <a:schemeClr val="bg1"/>
-                </a:solidFill>
-              </a:rPr>
-              <a:t>Movies with more wins tend to have more nominations.</a:t>
-            </a:r>
-          </a:p>
-          <a:p>
-            <a:r>
-              <a:rPr lang="en-US" sz="2400" dirty="0">
-                <a:solidFill>
-                  <a:schemeClr val="bg1"/>
-                </a:solidFill>
-              </a:rPr>
-              <a:t>Could be other factors at play as well.</a:t>
-            </a:r>
+              <a:t>Drama and Comedy are the leaders.</a:t>
+            </a:r>
+          </a:p>
+          <a:p>
+            <a:endParaRPr lang="en-CA" sz="1400" dirty="0">
+              <a:solidFill>
+                <a:srgbClr val="3B3B3B"/>
+              </a:solidFill>
+              <a:latin typeface="Menlo" panose="020B0609030804020204" pitchFamily="49" charset="0"/>
+            </a:endParaRPr>
           </a:p>
         </p:txBody>
       </p:sp>
@@ -4340,10 +4174,10 @@
       </p:sp>
       <p:sp>
         <p:nvSpPr>
-          <p:cNvPr id="3" name="Content Placeholder 2">
-            <a:extLst>
-              <a:ext uri="{FF2B5EF4-FFF2-40B4-BE49-F238E27FC236}">
-                <a16:creationId xmlns:a16="http://schemas.microsoft.com/office/drawing/2014/main" id="{6761B477-DA92-F75A-23B6-625BAC451D6D}"/>
+          <p:cNvPr id="4" name="Content Placeholder 2">
+            <a:extLst>
+              <a:ext uri="{FF2B5EF4-FFF2-40B4-BE49-F238E27FC236}">
+                <a16:creationId xmlns:a16="http://schemas.microsoft.com/office/drawing/2014/main" id="{DCA45861-293B-1B7C-04AC-CB2E58209BB0}"/>
               </a:ext>
             </a:extLst>
           </p:cNvPr>
@@ -4354,7 +4188,12 @@
             <p:ph idx="1"/>
           </p:nvPr>
         </p:nvSpPr>
-        <p:spPr/>
+        <p:spPr>
+          <a:xfrm>
+            <a:off x="838200" y="1690689"/>
+            <a:ext cx="10515600" cy="4676244"/>
+          </a:xfrm>
+        </p:spPr>
         <p:txBody>
           <a:bodyPr>
             <a:normAutofit/>
@@ -4362,29 +4201,69 @@
           <a:lstStyle/>
           <a:p>
             <a:r>
-              <a:rPr lang="en-US" sz="2400" dirty="0">
+              <a:rPr lang="en-US" sz="3200" dirty="0">
                 <a:solidFill>
                   <a:schemeClr val="bg1"/>
                 </a:solidFill>
+                <a:latin typeface="Helvetica Neue" panose="02000503000000020004" pitchFamily="2" charset="0"/>
+                <a:ea typeface="Helvetica Neue" panose="02000503000000020004" pitchFamily="2" charset="0"/>
+                <a:cs typeface="Helvetica Neue" panose="02000503000000020004" pitchFamily="2" charset="0"/>
               </a:rPr>
-              <a:t>All movies have a runtime over 100mins and under 134mins.</a:t>
-            </a:r>
-          </a:p>
-          <a:p>
-            <a:r>
-              <a:rPr lang="en-US" sz="2400" dirty="0">
+              <a:t>Runtimes effect awards wins.</a:t>
+            </a:r>
+          </a:p>
+          <a:p>
+            <a:r>
+              <a:rPr lang="en-US" sz="3200" dirty="0">
                 <a:solidFill>
                   <a:schemeClr val="bg1"/>
                 </a:solidFill>
+                <a:latin typeface="Helvetica Neue" panose="02000503000000020004" pitchFamily="2" charset="0"/>
+                <a:ea typeface="Helvetica Neue" panose="02000503000000020004" pitchFamily="2" charset="0"/>
+                <a:cs typeface="Helvetica Neue" panose="02000503000000020004" pitchFamily="2" charset="0"/>
               </a:rPr>
-              <a:t>The more a movie is nominated is the more likely it is to win.</a:t>
-            </a:r>
-          </a:p>
-          <a:p>
-            <a:endParaRPr lang="en-US" sz="2400" dirty="0">
+              <a:t>Box office success does not guarantee a higher number of nominations.</a:t>
+            </a:r>
+          </a:p>
+          <a:p>
+            <a:r>
+              <a:rPr lang="en-US" sz="3200" dirty="0">
+                <a:solidFill>
+                  <a:schemeClr val="bg1"/>
+                </a:solidFill>
+                <a:latin typeface="Helvetica Neue" panose="02000503000000020004" pitchFamily="2" charset="0"/>
+                <a:ea typeface="Helvetica Neue" panose="02000503000000020004" pitchFamily="2" charset="0"/>
+                <a:cs typeface="Helvetica Neue" panose="02000503000000020004" pitchFamily="2" charset="0"/>
+              </a:rPr>
+              <a:t>A lot of content is Drama, Comedy and Biographies.</a:t>
+            </a:r>
+          </a:p>
+          <a:p>
+            <a:pPr marL="0" indent="0">
+              <a:buNone/>
+            </a:pPr>
+            <a:endParaRPr lang="en-US" sz="3200" dirty="0">
               <a:solidFill>
                 <a:schemeClr val="bg1"/>
               </a:solidFill>
+              <a:latin typeface="Helvetica Neue" panose="02000503000000020004" pitchFamily="2" charset="0"/>
+              <a:ea typeface="Helvetica Neue" panose="02000503000000020004" pitchFamily="2" charset="0"/>
+              <a:cs typeface="Helvetica Neue" panose="02000503000000020004" pitchFamily="2" charset="0"/>
+            </a:endParaRPr>
+          </a:p>
+          <a:p>
+            <a:pPr marL="0" indent="0">
+              <a:lnSpc>
+                <a:spcPts val="1350"/>
+              </a:lnSpc>
+              <a:buNone/>
+            </a:pPr>
+            <a:endParaRPr lang="en-CA" sz="1400" b="0" dirty="0">
+              <a:solidFill>
+                <a:srgbClr val="3B3B3B"/>
+              </a:solidFill>
+              <a:effectLst/>
+              <a:latin typeface="Menlo" panose="020B0609030804020204" pitchFamily="49" charset="0"/>
             </a:endParaRPr>
           </a:p>
         </p:txBody>

</xml_diff>

<commit_message>
2.1 - General refinements. This concludes my second wave of refinements to the project.
</commit_message>
<xml_diff>
--- a/movie_presentation.pptx
+++ b/movie_presentation.pptx
@@ -4209,7 +4209,7 @@
                 <a:ea typeface="Helvetica Neue" panose="02000503000000020004" pitchFamily="2" charset="0"/>
                 <a:cs typeface="Helvetica Neue" panose="02000503000000020004" pitchFamily="2" charset="0"/>
               </a:rPr>
-              <a:t>Runtimes effect awards wins.</a:t>
+              <a:t>The longer a film is the more likely it is to win awards.</a:t>
             </a:r>
           </a:p>
           <a:p>
@@ -4235,7 +4235,7 @@
                 <a:ea typeface="Helvetica Neue" panose="02000503000000020004" pitchFamily="2" charset="0"/>
                 <a:cs typeface="Helvetica Neue" panose="02000503000000020004" pitchFamily="2" charset="0"/>
               </a:rPr>
-              <a:t>A lot of content is Drama, Comedy and Biographies.</a:t>
+              <a:t>Nearly two thirds of content is Drama, Comedy and Biographies.</a:t>
             </a:r>
           </a:p>
           <a:p>

</xml_diff>